<commit_message>
made some changes to the pptx
</commit_message>
<xml_diff>
--- a/FinalProjectPresentation.pptx
+++ b/FinalProjectPresentation.pptx
@@ -5,11 +5,12 @@
     <p:sldMasterId id="2147483648" r:id="rId1"/>
   </p:sldMasterIdLst>
   <p:sldIdLst>
-    <p:sldId id="256" r:id="rId2"/>
-    <p:sldId id="257" r:id="rId3"/>
-    <p:sldId id="258" r:id="rId4"/>
-    <p:sldId id="259" r:id="rId5"/>
-    <p:sldId id="260" r:id="rId6"/>
+    <p:sldId id="261" r:id="rId2"/>
+    <p:sldId id="256" r:id="rId3"/>
+    <p:sldId id="257" r:id="rId4"/>
+    <p:sldId id="258" r:id="rId5"/>
+    <p:sldId id="259" r:id="rId6"/>
+    <p:sldId id="260" r:id="rId7"/>
   </p:sldIdLst>
   <p:sldSz cx="12192000" cy="6858000"/>
   <p:notesSz cx="6858000" cy="9144000"/>
@@ -158,10 +159,9 @@
           </a:lstStyle>
           <a:p>
             <a:r>
-              <a:rPr lang="en-US" smtClean="0"/>
+              <a:rPr lang="en-US"/>
               <a:t>Click to edit Master title style</a:t>
             </a:r>
-            <a:endParaRPr lang="en-US"/>
           </a:p>
         </p:txBody>
       </p:sp>
@@ -223,10 +223,9 @@
           </a:lstStyle>
           <a:p>
             <a:r>
-              <a:rPr lang="en-US" smtClean="0"/>
+              <a:rPr lang="en-US"/>
               <a:t>Click to edit Master subtitle style</a:t>
             </a:r>
-            <a:endParaRPr lang="en-US"/>
           </a:p>
         </p:txBody>
       </p:sp>
@@ -247,7 +246,7 @@
           <a:p>
             <a:fld id="{C36C407C-7FA2-734E-9C41-6BDD6C074F1B}" type="datetimeFigureOut">
               <a:rPr lang="en-US" smtClean="0"/>
-              <a:t>6/9/19</a:t>
+              <a:t>6/10/2019</a:t>
             </a:fld>
             <a:endParaRPr lang="en-US"/>
           </a:p>
@@ -341,10 +340,9 @@
           <a:lstStyle/>
           <a:p>
             <a:r>
-              <a:rPr lang="en-US" smtClean="0"/>
+              <a:rPr lang="en-US"/>
               <a:t>Click to edit Master title style</a:t>
             </a:r>
-            <a:endParaRPr lang="en-US"/>
           </a:p>
         </p:txBody>
       </p:sp>
@@ -365,38 +363,37 @@
           <a:p>
             <a:pPr lvl="0"/>
             <a:r>
-              <a:rPr lang="en-US" smtClean="0"/>
+              <a:rPr lang="en-US"/>
               <a:t>Click to edit Master text styles</a:t>
             </a:r>
           </a:p>
           <a:p>
             <a:pPr lvl="1"/>
             <a:r>
-              <a:rPr lang="en-US" smtClean="0"/>
+              <a:rPr lang="en-US"/>
               <a:t>Second level</a:t>
             </a:r>
           </a:p>
           <a:p>
             <a:pPr lvl="2"/>
             <a:r>
-              <a:rPr lang="en-US" smtClean="0"/>
+              <a:rPr lang="en-US"/>
               <a:t>Third level</a:t>
             </a:r>
           </a:p>
           <a:p>
             <a:pPr lvl="3"/>
             <a:r>
-              <a:rPr lang="en-US" smtClean="0"/>
+              <a:rPr lang="en-US"/>
               <a:t>Fourth level</a:t>
             </a:r>
           </a:p>
           <a:p>
             <a:pPr lvl="4"/>
             <a:r>
-              <a:rPr lang="en-US" smtClean="0"/>
+              <a:rPr lang="en-US"/>
               <a:t>Fifth level</a:t>
             </a:r>
-            <a:endParaRPr lang="en-US"/>
           </a:p>
         </p:txBody>
       </p:sp>
@@ -417,7 +414,7 @@
           <a:p>
             <a:fld id="{C36C407C-7FA2-734E-9C41-6BDD6C074F1B}" type="datetimeFigureOut">
               <a:rPr lang="en-US" smtClean="0"/>
-              <a:t>6/9/19</a:t>
+              <a:t>6/10/2019</a:t>
             </a:fld>
             <a:endParaRPr lang="en-US"/>
           </a:p>
@@ -516,10 +513,9 @@
           <a:lstStyle/>
           <a:p>
             <a:r>
-              <a:rPr lang="en-US" smtClean="0"/>
+              <a:rPr lang="en-US"/>
               <a:t>Click to edit Master title style</a:t>
             </a:r>
-            <a:endParaRPr lang="en-US"/>
           </a:p>
         </p:txBody>
       </p:sp>
@@ -545,38 +541,37 @@
           <a:p>
             <a:pPr lvl="0"/>
             <a:r>
-              <a:rPr lang="en-US" smtClean="0"/>
+              <a:rPr lang="en-US"/>
               <a:t>Click to edit Master text styles</a:t>
             </a:r>
           </a:p>
           <a:p>
             <a:pPr lvl="1"/>
             <a:r>
-              <a:rPr lang="en-US" smtClean="0"/>
+              <a:rPr lang="en-US"/>
               <a:t>Second level</a:t>
             </a:r>
           </a:p>
           <a:p>
             <a:pPr lvl="2"/>
             <a:r>
-              <a:rPr lang="en-US" smtClean="0"/>
+              <a:rPr lang="en-US"/>
               <a:t>Third level</a:t>
             </a:r>
           </a:p>
           <a:p>
             <a:pPr lvl="3"/>
             <a:r>
-              <a:rPr lang="en-US" smtClean="0"/>
+              <a:rPr lang="en-US"/>
               <a:t>Fourth level</a:t>
             </a:r>
           </a:p>
           <a:p>
             <a:pPr lvl="4"/>
             <a:r>
-              <a:rPr lang="en-US" smtClean="0"/>
+              <a:rPr lang="en-US"/>
               <a:t>Fifth level</a:t>
             </a:r>
-            <a:endParaRPr lang="en-US"/>
           </a:p>
         </p:txBody>
       </p:sp>
@@ -597,7 +592,7 @@
           <a:p>
             <a:fld id="{C36C407C-7FA2-734E-9C41-6BDD6C074F1B}" type="datetimeFigureOut">
               <a:rPr lang="en-US" smtClean="0"/>
-              <a:t>6/9/19</a:t>
+              <a:t>6/10/2019</a:t>
             </a:fld>
             <a:endParaRPr lang="en-US"/>
           </a:p>
@@ -691,10 +686,9 @@
           <a:lstStyle/>
           <a:p>
             <a:r>
-              <a:rPr lang="en-US" smtClean="0"/>
+              <a:rPr lang="en-US"/>
               <a:t>Click to edit Master title style</a:t>
             </a:r>
-            <a:endParaRPr lang="en-US"/>
           </a:p>
         </p:txBody>
       </p:sp>
@@ -715,38 +709,37 @@
           <a:p>
             <a:pPr lvl="0"/>
             <a:r>
-              <a:rPr lang="en-US" smtClean="0"/>
+              <a:rPr lang="en-US"/>
               <a:t>Click to edit Master text styles</a:t>
             </a:r>
           </a:p>
           <a:p>
             <a:pPr lvl="1"/>
             <a:r>
-              <a:rPr lang="en-US" smtClean="0"/>
+              <a:rPr lang="en-US"/>
               <a:t>Second level</a:t>
             </a:r>
           </a:p>
           <a:p>
             <a:pPr lvl="2"/>
             <a:r>
-              <a:rPr lang="en-US" smtClean="0"/>
+              <a:rPr lang="en-US"/>
               <a:t>Third level</a:t>
             </a:r>
           </a:p>
           <a:p>
             <a:pPr lvl="3"/>
             <a:r>
-              <a:rPr lang="en-US" smtClean="0"/>
+              <a:rPr lang="en-US"/>
               <a:t>Fourth level</a:t>
             </a:r>
           </a:p>
           <a:p>
             <a:pPr lvl="4"/>
             <a:r>
-              <a:rPr lang="en-US" smtClean="0"/>
+              <a:rPr lang="en-US"/>
               <a:t>Fifth level</a:t>
             </a:r>
-            <a:endParaRPr lang="en-US"/>
           </a:p>
         </p:txBody>
       </p:sp>
@@ -767,7 +760,7 @@
           <a:p>
             <a:fld id="{C36C407C-7FA2-734E-9C41-6BDD6C074F1B}" type="datetimeFigureOut">
               <a:rPr lang="en-US" smtClean="0"/>
-              <a:t>6/9/19</a:t>
+              <a:t>6/10/2019</a:t>
             </a:fld>
             <a:endParaRPr lang="en-US"/>
           </a:p>
@@ -870,10 +863,9 @@
           </a:lstStyle>
           <a:p>
             <a:r>
-              <a:rPr lang="en-US" smtClean="0"/>
+              <a:rPr lang="en-US"/>
               <a:t>Click to edit Master title style</a:t>
             </a:r>
-            <a:endParaRPr lang="en-US"/>
           </a:p>
         </p:txBody>
       </p:sp>
@@ -990,7 +982,7 @@
           <a:p>
             <a:pPr lvl="0"/>
             <a:r>
-              <a:rPr lang="en-US" smtClean="0"/>
+              <a:rPr lang="en-US"/>
               <a:t>Click to edit Master text styles</a:t>
             </a:r>
           </a:p>
@@ -1013,7 +1005,7 @@
           <a:p>
             <a:fld id="{C36C407C-7FA2-734E-9C41-6BDD6C074F1B}" type="datetimeFigureOut">
               <a:rPr lang="en-US" smtClean="0"/>
-              <a:t>6/9/19</a:t>
+              <a:t>6/10/2019</a:t>
             </a:fld>
             <a:endParaRPr lang="en-US"/>
           </a:p>
@@ -1107,10 +1099,9 @@
           <a:lstStyle/>
           <a:p>
             <a:r>
-              <a:rPr lang="en-US" smtClean="0"/>
+              <a:rPr lang="en-US"/>
               <a:t>Click to edit Master title style</a:t>
             </a:r>
-            <a:endParaRPr lang="en-US"/>
           </a:p>
         </p:txBody>
       </p:sp>
@@ -1136,38 +1127,37 @@
           <a:p>
             <a:pPr lvl="0"/>
             <a:r>
-              <a:rPr lang="en-US" smtClean="0"/>
+              <a:rPr lang="en-US"/>
               <a:t>Click to edit Master text styles</a:t>
             </a:r>
           </a:p>
           <a:p>
             <a:pPr lvl="1"/>
             <a:r>
-              <a:rPr lang="en-US" smtClean="0"/>
+              <a:rPr lang="en-US"/>
               <a:t>Second level</a:t>
             </a:r>
           </a:p>
           <a:p>
             <a:pPr lvl="2"/>
             <a:r>
-              <a:rPr lang="en-US" smtClean="0"/>
+              <a:rPr lang="en-US"/>
               <a:t>Third level</a:t>
             </a:r>
           </a:p>
           <a:p>
             <a:pPr lvl="3"/>
             <a:r>
-              <a:rPr lang="en-US" smtClean="0"/>
+              <a:rPr lang="en-US"/>
               <a:t>Fourth level</a:t>
             </a:r>
           </a:p>
           <a:p>
             <a:pPr lvl="4"/>
             <a:r>
-              <a:rPr lang="en-US" smtClean="0"/>
+              <a:rPr lang="en-US"/>
               <a:t>Fifth level</a:t>
             </a:r>
-            <a:endParaRPr lang="en-US"/>
           </a:p>
         </p:txBody>
       </p:sp>
@@ -1193,38 +1183,37 @@
           <a:p>
             <a:pPr lvl="0"/>
             <a:r>
-              <a:rPr lang="en-US" smtClean="0"/>
+              <a:rPr lang="en-US"/>
               <a:t>Click to edit Master text styles</a:t>
             </a:r>
           </a:p>
           <a:p>
             <a:pPr lvl="1"/>
             <a:r>
-              <a:rPr lang="en-US" smtClean="0"/>
+              <a:rPr lang="en-US"/>
               <a:t>Second level</a:t>
             </a:r>
           </a:p>
           <a:p>
             <a:pPr lvl="2"/>
             <a:r>
-              <a:rPr lang="en-US" smtClean="0"/>
+              <a:rPr lang="en-US"/>
               <a:t>Third level</a:t>
             </a:r>
           </a:p>
           <a:p>
             <a:pPr lvl="3"/>
             <a:r>
-              <a:rPr lang="en-US" smtClean="0"/>
+              <a:rPr lang="en-US"/>
               <a:t>Fourth level</a:t>
             </a:r>
           </a:p>
           <a:p>
             <a:pPr lvl="4"/>
             <a:r>
-              <a:rPr lang="en-US" smtClean="0"/>
+              <a:rPr lang="en-US"/>
               <a:t>Fifth level</a:t>
             </a:r>
-            <a:endParaRPr lang="en-US"/>
           </a:p>
         </p:txBody>
       </p:sp>
@@ -1245,7 +1234,7 @@
           <a:p>
             <a:fld id="{C36C407C-7FA2-734E-9C41-6BDD6C074F1B}" type="datetimeFigureOut">
               <a:rPr lang="en-US" smtClean="0"/>
-              <a:t>6/9/19</a:t>
+              <a:t>6/10/2019</a:t>
             </a:fld>
             <a:endParaRPr lang="en-US"/>
           </a:p>
@@ -1344,10 +1333,9 @@
           <a:lstStyle/>
           <a:p>
             <a:r>
-              <a:rPr lang="en-US" smtClean="0"/>
+              <a:rPr lang="en-US"/>
               <a:t>Click to edit Master title style</a:t>
             </a:r>
-            <a:endParaRPr lang="en-US"/>
           </a:p>
         </p:txBody>
       </p:sp>
@@ -1410,7 +1398,7 @@
           <a:p>
             <a:pPr lvl="0"/>
             <a:r>
-              <a:rPr lang="en-US" smtClean="0"/>
+              <a:rPr lang="en-US"/>
               <a:t>Click to edit Master text styles</a:t>
             </a:r>
           </a:p>
@@ -1438,38 +1426,37 @@
           <a:p>
             <a:pPr lvl="0"/>
             <a:r>
-              <a:rPr lang="en-US" smtClean="0"/>
+              <a:rPr lang="en-US"/>
               <a:t>Click to edit Master text styles</a:t>
             </a:r>
           </a:p>
           <a:p>
             <a:pPr lvl="1"/>
             <a:r>
-              <a:rPr lang="en-US" smtClean="0"/>
+              <a:rPr lang="en-US"/>
               <a:t>Second level</a:t>
             </a:r>
           </a:p>
           <a:p>
             <a:pPr lvl="2"/>
             <a:r>
-              <a:rPr lang="en-US" smtClean="0"/>
+              <a:rPr lang="en-US"/>
               <a:t>Third level</a:t>
             </a:r>
           </a:p>
           <a:p>
             <a:pPr lvl="3"/>
             <a:r>
-              <a:rPr lang="en-US" smtClean="0"/>
+              <a:rPr lang="en-US"/>
               <a:t>Fourth level</a:t>
             </a:r>
           </a:p>
           <a:p>
             <a:pPr lvl="4"/>
             <a:r>
-              <a:rPr lang="en-US" smtClean="0"/>
+              <a:rPr lang="en-US"/>
               <a:t>Fifth level</a:t>
             </a:r>
-            <a:endParaRPr lang="en-US"/>
           </a:p>
         </p:txBody>
       </p:sp>
@@ -1532,7 +1519,7 @@
           <a:p>
             <a:pPr lvl="0"/>
             <a:r>
-              <a:rPr lang="en-US" smtClean="0"/>
+              <a:rPr lang="en-US"/>
               <a:t>Click to edit Master text styles</a:t>
             </a:r>
           </a:p>
@@ -1560,38 +1547,37 @@
           <a:p>
             <a:pPr lvl="0"/>
             <a:r>
-              <a:rPr lang="en-US" smtClean="0"/>
+              <a:rPr lang="en-US"/>
               <a:t>Click to edit Master text styles</a:t>
             </a:r>
           </a:p>
           <a:p>
             <a:pPr lvl="1"/>
             <a:r>
-              <a:rPr lang="en-US" smtClean="0"/>
+              <a:rPr lang="en-US"/>
               <a:t>Second level</a:t>
             </a:r>
           </a:p>
           <a:p>
             <a:pPr lvl="2"/>
             <a:r>
-              <a:rPr lang="en-US" smtClean="0"/>
+              <a:rPr lang="en-US"/>
               <a:t>Third level</a:t>
             </a:r>
           </a:p>
           <a:p>
             <a:pPr lvl="3"/>
             <a:r>
-              <a:rPr lang="en-US" smtClean="0"/>
+              <a:rPr lang="en-US"/>
               <a:t>Fourth level</a:t>
             </a:r>
           </a:p>
           <a:p>
             <a:pPr lvl="4"/>
             <a:r>
-              <a:rPr lang="en-US" smtClean="0"/>
+              <a:rPr lang="en-US"/>
               <a:t>Fifth level</a:t>
             </a:r>
-            <a:endParaRPr lang="en-US"/>
           </a:p>
         </p:txBody>
       </p:sp>
@@ -1612,7 +1598,7 @@
           <a:p>
             <a:fld id="{C36C407C-7FA2-734E-9C41-6BDD6C074F1B}" type="datetimeFigureOut">
               <a:rPr lang="en-US" smtClean="0"/>
-              <a:t>6/9/19</a:t>
+              <a:t>6/10/2019</a:t>
             </a:fld>
             <a:endParaRPr lang="en-US"/>
           </a:p>
@@ -1706,10 +1692,9 @@
           <a:lstStyle/>
           <a:p>
             <a:r>
-              <a:rPr lang="en-US" smtClean="0"/>
+              <a:rPr lang="en-US"/>
               <a:t>Click to edit Master title style</a:t>
             </a:r>
-            <a:endParaRPr lang="en-US"/>
           </a:p>
         </p:txBody>
       </p:sp>
@@ -1730,7 +1715,7 @@
           <a:p>
             <a:fld id="{C36C407C-7FA2-734E-9C41-6BDD6C074F1B}" type="datetimeFigureOut">
               <a:rPr lang="en-US" smtClean="0"/>
-              <a:t>6/9/19</a:t>
+              <a:t>6/10/2019</a:t>
             </a:fld>
             <a:endParaRPr lang="en-US"/>
           </a:p>
@@ -1825,7 +1810,7 @@
           <a:p>
             <a:fld id="{C36C407C-7FA2-734E-9C41-6BDD6C074F1B}" type="datetimeFigureOut">
               <a:rPr lang="en-US" smtClean="0"/>
-              <a:t>6/9/19</a:t>
+              <a:t>6/10/2019</a:t>
             </a:fld>
             <a:endParaRPr lang="en-US"/>
           </a:p>
@@ -1928,10 +1913,9 @@
           </a:lstStyle>
           <a:p>
             <a:r>
-              <a:rPr lang="en-US" smtClean="0"/>
+              <a:rPr lang="en-US"/>
               <a:t>Click to edit Master title style</a:t>
             </a:r>
-            <a:endParaRPr lang="en-US"/>
           </a:p>
         </p:txBody>
       </p:sp>
@@ -1985,38 +1969,37 @@
           <a:p>
             <a:pPr lvl="0"/>
             <a:r>
-              <a:rPr lang="en-US" smtClean="0"/>
+              <a:rPr lang="en-US"/>
               <a:t>Click to edit Master text styles</a:t>
             </a:r>
           </a:p>
           <a:p>
             <a:pPr lvl="1"/>
             <a:r>
-              <a:rPr lang="en-US" smtClean="0"/>
+              <a:rPr lang="en-US"/>
               <a:t>Second level</a:t>
             </a:r>
           </a:p>
           <a:p>
             <a:pPr lvl="2"/>
             <a:r>
-              <a:rPr lang="en-US" smtClean="0"/>
+              <a:rPr lang="en-US"/>
               <a:t>Third level</a:t>
             </a:r>
           </a:p>
           <a:p>
             <a:pPr lvl="3"/>
             <a:r>
-              <a:rPr lang="en-US" smtClean="0"/>
+              <a:rPr lang="en-US"/>
               <a:t>Fourth level</a:t>
             </a:r>
           </a:p>
           <a:p>
             <a:pPr lvl="4"/>
             <a:r>
-              <a:rPr lang="en-US" smtClean="0"/>
+              <a:rPr lang="en-US"/>
               <a:t>Fifth level</a:t>
             </a:r>
-            <a:endParaRPr lang="en-US"/>
           </a:p>
         </p:txBody>
       </p:sp>
@@ -2079,7 +2062,7 @@
           <a:p>
             <a:pPr lvl="0"/>
             <a:r>
-              <a:rPr lang="en-US" smtClean="0"/>
+              <a:rPr lang="en-US"/>
               <a:t>Click to edit Master text styles</a:t>
             </a:r>
           </a:p>
@@ -2102,7 +2085,7 @@
           <a:p>
             <a:fld id="{C36C407C-7FA2-734E-9C41-6BDD6C074F1B}" type="datetimeFigureOut">
               <a:rPr lang="en-US" smtClean="0"/>
-              <a:t>6/9/19</a:t>
+              <a:t>6/10/2019</a:t>
             </a:fld>
             <a:endParaRPr lang="en-US"/>
           </a:p>
@@ -2205,10 +2188,9 @@
           </a:lstStyle>
           <a:p>
             <a:r>
-              <a:rPr lang="en-US" smtClean="0"/>
+              <a:rPr lang="en-US"/>
               <a:t>Click to edit Master title style</a:t>
             </a:r>
-            <a:endParaRPr lang="en-US"/>
           </a:p>
         </p:txBody>
       </p:sp>
@@ -2332,7 +2314,7 @@
           <a:p>
             <a:pPr lvl="0"/>
             <a:r>
-              <a:rPr lang="en-US" smtClean="0"/>
+              <a:rPr lang="en-US"/>
               <a:t>Click to edit Master text styles</a:t>
             </a:r>
           </a:p>
@@ -2355,7 +2337,7 @@
           <a:p>
             <a:fld id="{C36C407C-7FA2-734E-9C41-6BDD6C074F1B}" type="datetimeFigureOut">
               <a:rPr lang="en-US" smtClean="0"/>
-              <a:t>6/9/19</a:t>
+              <a:t>6/10/2019</a:t>
             </a:fld>
             <a:endParaRPr lang="en-US"/>
           </a:p>
@@ -2469,10 +2451,9 @@
           <a:lstStyle/>
           <a:p>
             <a:r>
-              <a:rPr lang="en-US" smtClean="0"/>
+              <a:rPr lang="en-US"/>
               <a:t>Click to edit Master title style</a:t>
             </a:r>
-            <a:endParaRPr lang="en-US"/>
           </a:p>
         </p:txBody>
       </p:sp>
@@ -2503,38 +2484,37 @@
           <a:p>
             <a:pPr lvl="0"/>
             <a:r>
-              <a:rPr lang="en-US" smtClean="0"/>
+              <a:rPr lang="en-US"/>
               <a:t>Click to edit Master text styles</a:t>
             </a:r>
           </a:p>
           <a:p>
             <a:pPr lvl="1"/>
             <a:r>
-              <a:rPr lang="en-US" smtClean="0"/>
+              <a:rPr lang="en-US"/>
               <a:t>Second level</a:t>
             </a:r>
           </a:p>
           <a:p>
             <a:pPr lvl="2"/>
             <a:r>
-              <a:rPr lang="en-US" smtClean="0"/>
+              <a:rPr lang="en-US"/>
               <a:t>Third level</a:t>
             </a:r>
           </a:p>
           <a:p>
             <a:pPr lvl="3"/>
             <a:r>
-              <a:rPr lang="en-US" smtClean="0"/>
+              <a:rPr lang="en-US"/>
               <a:t>Fourth level</a:t>
             </a:r>
           </a:p>
           <a:p>
             <a:pPr lvl="4"/>
             <a:r>
-              <a:rPr lang="en-US" smtClean="0"/>
+              <a:rPr lang="en-US"/>
               <a:t>Fifth level</a:t>
             </a:r>
-            <a:endParaRPr lang="en-US"/>
           </a:p>
         </p:txBody>
       </p:sp>
@@ -2573,7 +2553,7 @@
           <a:p>
             <a:fld id="{C36C407C-7FA2-734E-9C41-6BDD6C074F1B}" type="datetimeFigureOut">
               <a:rPr lang="en-US" smtClean="0"/>
-              <a:t>6/9/19</a:t>
+              <a:t>6/10/2019</a:t>
             </a:fld>
             <a:endParaRPr lang="en-US"/>
           </a:p>
@@ -2980,7 +2960,13 @@
       </p:grpSpPr>
       <p:sp>
         <p:nvSpPr>
-          <p:cNvPr id="2" name="Title 1"/>
+          <p:cNvPr id="2" name="Title 1">
+            <a:extLst>
+              <a:ext uri="{FF2B5EF4-FFF2-40B4-BE49-F238E27FC236}">
+                <a16:creationId xmlns:a16="http://schemas.microsoft.com/office/drawing/2014/main" id="{E7946B9A-12FE-42B0-8708-2DCFB94A4DFD}"/>
+              </a:ext>
+            </a:extLst>
+          </p:cNvPr>
           <p:cNvSpPr>
             <a:spLocks noGrp="1"/>
           </p:cNvSpPr>
@@ -2990,27 +2976,37 @@
         </p:nvSpPr>
         <p:spPr>
           <a:xfrm>
-            <a:off x="188259" y="187863"/>
-            <a:ext cx="9906000" cy="1631576"/>
+            <a:off x="721701" y="689318"/>
+            <a:ext cx="10748597" cy="2806578"/>
           </a:xfrm>
         </p:spPr>
         <p:txBody>
           <a:bodyPr>
-            <a:normAutofit fontScale="90000"/>
+            <a:normAutofit/>
           </a:bodyPr>
           <a:lstStyle/>
           <a:p>
             <a:r>
-              <a:rPr lang="en-US" dirty="0" smtClean="0"/>
+              <a:rPr lang="en-US" dirty="0">
+                <a:latin typeface="Britannic Bold" panose="020B0604020202020204" pitchFamily="34" charset="0"/>
+              </a:rPr>
               <a:t>Civilian Casualties and Migration in the Syrian Civil War</a:t>
             </a:r>
-            <a:endParaRPr lang="en-US" dirty="0"/>
-          </a:p>
-        </p:txBody>
-      </p:sp>
-      <p:sp>
-        <p:nvSpPr>
-          <p:cNvPr id="3" name="Subtitle 2"/>
+            <a:endParaRPr lang="en-US" b="1" dirty="0">
+              <a:latin typeface="Britannic Bold" panose="020B0604020202020204" pitchFamily="34" charset="0"/>
+            </a:endParaRPr>
+          </a:p>
+        </p:txBody>
+      </p:sp>
+      <p:sp>
+        <p:nvSpPr>
+          <p:cNvPr id="3" name="Subtitle 2">
+            <a:extLst>
+              <a:ext uri="{FF2B5EF4-FFF2-40B4-BE49-F238E27FC236}">
+                <a16:creationId xmlns:a16="http://schemas.microsoft.com/office/drawing/2014/main" id="{2E342A88-F526-487F-AE3C-C8EADF06AC24}"/>
+              </a:ext>
+            </a:extLst>
+          </p:cNvPr>
           <p:cNvSpPr>
             <a:spLocks noGrp="1"/>
           </p:cNvSpPr>
@@ -3020,304 +3016,38 @@
         </p:nvSpPr>
         <p:spPr>
           <a:xfrm>
-            <a:off x="528345" y="2762656"/>
-            <a:ext cx="9565914" cy="2801566"/>
+            <a:off x="1524000" y="4318782"/>
+            <a:ext cx="9144000" cy="939018"/>
           </a:xfrm>
         </p:spPr>
         <p:txBody>
-          <a:bodyPr>
-            <a:noAutofit/>
-          </a:bodyPr>
-          <a:lstStyle/>
-          <a:p>
-            <a:pPr algn="l"/>
-            <a:r>
-              <a:rPr lang="en-US" sz="2500" dirty="0" smtClean="0"/>
-              <a:t>Questions Explored</a:t>
-            </a:r>
-            <a:r>
-              <a:rPr lang="en-US" sz="2500" dirty="0" smtClean="0"/>
-              <a:t>:</a:t>
-            </a:r>
-            <a:endParaRPr lang="en-US" sz="2500" dirty="0" smtClean="0"/>
-          </a:p>
-          <a:p>
-            <a:pPr marL="342900" indent="-342900" algn="l">
-              <a:buFont typeface="Arial" charset="0"/>
-              <a:buChar char="•"/>
-            </a:pPr>
-            <a:r>
-              <a:rPr lang="en-US" sz="2500" dirty="0"/>
-              <a:t>What are the patterns of casualties and migration of the Syrian Civil War</a:t>
-            </a:r>
-            <a:r>
-              <a:rPr lang="en-US" sz="2500" dirty="0" smtClean="0"/>
-              <a:t>?</a:t>
-            </a:r>
-          </a:p>
-          <a:p>
-            <a:pPr marL="342900" indent="-342900" algn="l">
-              <a:buFont typeface="Arial" charset="0"/>
-              <a:buChar char="•"/>
-            </a:pPr>
-            <a:r>
-              <a:rPr lang="en-US" sz="2500" dirty="0"/>
-              <a:t>Can we identify major events that correspond to these patterns</a:t>
-            </a:r>
-            <a:r>
-              <a:rPr lang="en-US" sz="2500" dirty="0" smtClean="0"/>
-              <a:t>?</a:t>
-            </a:r>
-            <a:endParaRPr lang="en-US" sz="2500" dirty="0" smtClean="0"/>
-          </a:p>
-          <a:p>
-            <a:pPr marL="342900" indent="-342900" algn="l">
-              <a:buFont typeface="Arial" charset="0"/>
-              <a:buChar char="•"/>
-            </a:pPr>
-            <a:r>
-              <a:rPr lang="en-US" sz="2500" dirty="0" smtClean="0"/>
-              <a:t>Where </a:t>
-            </a:r>
-            <a:r>
-              <a:rPr lang="en-US" sz="2500" dirty="0" smtClean="0"/>
-              <a:t>are civilians seeking refuge?</a:t>
-            </a:r>
-          </a:p>
-          <a:p>
-            <a:pPr marL="342900" indent="-342900" algn="l">
-              <a:buFont typeface="Arial" charset="0"/>
-              <a:buChar char="•"/>
-            </a:pPr>
-            <a:r>
-              <a:rPr lang="en-US" sz="2500" dirty="0" smtClean="0"/>
-              <a:t>How do provincial casualties change with time?</a:t>
-            </a:r>
-          </a:p>
-          <a:p>
-            <a:pPr marL="342900" indent="-342900" algn="l">
-              <a:buFont typeface="Arial" charset="0"/>
-              <a:buChar char="•"/>
-            </a:pPr>
-            <a:r>
-              <a:rPr lang="en-US" sz="2500" dirty="0" smtClean="0"/>
-              <a:t>What forms of violence are taking place?</a:t>
-            </a:r>
-          </a:p>
-        </p:txBody>
-      </p:sp>
-      <p:sp>
-        <p:nvSpPr>
-          <p:cNvPr id="5" name="Subtitle 2"/>
-          <p:cNvSpPr txBox="1">
-            <a:spLocks/>
-          </p:cNvSpPr>
-          <p:nvPr/>
-        </p:nvSpPr>
-        <p:spPr>
-          <a:xfrm>
-            <a:off x="528345" y="2035451"/>
-            <a:ext cx="9403213" cy="511193"/>
-          </a:xfrm>
-          <a:prstGeom prst="rect">
-            <a:avLst/>
-          </a:prstGeom>
-        </p:spPr>
-        <p:txBody>
-          <a:bodyPr vert="horz" lIns="91440" tIns="45720" rIns="91440" bIns="45720" rtlCol="0">
-            <a:normAutofit/>
-          </a:bodyPr>
-          <a:lstStyle>
-            <a:lvl1pPr marL="0" indent="0" algn="ctr" defTabSz="914400" rtl="0" eaLnBrk="1" latinLnBrk="0" hangingPunct="1">
-              <a:lnSpc>
-                <a:spcPct val="90000"/>
-              </a:lnSpc>
-              <a:spcBef>
-                <a:spcPts val="1000"/>
-              </a:spcBef>
-              <a:buFont typeface="Arial"/>
-              <a:buNone/>
-              <a:defRPr sz="2400" kern="1200">
-                <a:solidFill>
-                  <a:schemeClr val="tx1"/>
-                </a:solidFill>
-                <a:latin typeface="+mn-lt"/>
-                <a:ea typeface="+mn-ea"/>
-                <a:cs typeface="+mn-cs"/>
-              </a:defRPr>
-            </a:lvl1pPr>
-            <a:lvl2pPr marL="457200" indent="0" algn="ctr" defTabSz="914400" rtl="0" eaLnBrk="1" latinLnBrk="0" hangingPunct="1">
-              <a:lnSpc>
-                <a:spcPct val="90000"/>
-              </a:lnSpc>
-              <a:spcBef>
-                <a:spcPts val="500"/>
-              </a:spcBef>
-              <a:buFont typeface="Arial"/>
-              <a:buNone/>
-              <a:defRPr sz="2000" kern="1200">
-                <a:solidFill>
-                  <a:schemeClr val="tx1"/>
-                </a:solidFill>
-                <a:latin typeface="+mn-lt"/>
-                <a:ea typeface="+mn-ea"/>
-                <a:cs typeface="+mn-cs"/>
-              </a:defRPr>
-            </a:lvl2pPr>
-            <a:lvl3pPr marL="914400" indent="0" algn="ctr" defTabSz="914400" rtl="0" eaLnBrk="1" latinLnBrk="0" hangingPunct="1">
-              <a:lnSpc>
-                <a:spcPct val="90000"/>
-              </a:lnSpc>
-              <a:spcBef>
-                <a:spcPts val="500"/>
-              </a:spcBef>
-              <a:buFont typeface="Arial"/>
-              <a:buNone/>
-              <a:defRPr sz="1800" kern="1200">
-                <a:solidFill>
-                  <a:schemeClr val="tx1"/>
-                </a:solidFill>
-                <a:latin typeface="+mn-lt"/>
-                <a:ea typeface="+mn-ea"/>
-                <a:cs typeface="+mn-cs"/>
-              </a:defRPr>
-            </a:lvl3pPr>
-            <a:lvl4pPr marL="1371600" indent="0" algn="ctr" defTabSz="914400" rtl="0" eaLnBrk="1" latinLnBrk="0" hangingPunct="1">
-              <a:lnSpc>
-                <a:spcPct val="90000"/>
-              </a:lnSpc>
-              <a:spcBef>
-                <a:spcPts val="500"/>
-              </a:spcBef>
-              <a:buFont typeface="Arial"/>
-              <a:buNone/>
-              <a:defRPr sz="1600" kern="1200">
-                <a:solidFill>
-                  <a:schemeClr val="tx1"/>
-                </a:solidFill>
-                <a:latin typeface="+mn-lt"/>
-                <a:ea typeface="+mn-ea"/>
-                <a:cs typeface="+mn-cs"/>
-              </a:defRPr>
-            </a:lvl4pPr>
-            <a:lvl5pPr marL="1828800" indent="0" algn="ctr" defTabSz="914400" rtl="0" eaLnBrk="1" latinLnBrk="0" hangingPunct="1">
-              <a:lnSpc>
-                <a:spcPct val="90000"/>
-              </a:lnSpc>
-              <a:spcBef>
-                <a:spcPts val="500"/>
-              </a:spcBef>
-              <a:buFont typeface="Arial"/>
-              <a:buNone/>
-              <a:defRPr sz="1600" kern="1200">
-                <a:solidFill>
-                  <a:schemeClr val="tx1"/>
-                </a:solidFill>
-                <a:latin typeface="+mn-lt"/>
-                <a:ea typeface="+mn-ea"/>
-                <a:cs typeface="+mn-cs"/>
-              </a:defRPr>
-            </a:lvl5pPr>
-            <a:lvl6pPr marL="2286000" indent="0" algn="ctr" defTabSz="914400" rtl="0" eaLnBrk="1" latinLnBrk="0" hangingPunct="1">
-              <a:lnSpc>
-                <a:spcPct val="90000"/>
-              </a:lnSpc>
-              <a:spcBef>
-                <a:spcPts val="500"/>
-              </a:spcBef>
-              <a:buFont typeface="Arial"/>
-              <a:buNone/>
-              <a:defRPr sz="1600" kern="1200">
-                <a:solidFill>
-                  <a:schemeClr val="tx1"/>
-                </a:solidFill>
-                <a:latin typeface="+mn-lt"/>
-                <a:ea typeface="+mn-ea"/>
-                <a:cs typeface="+mn-cs"/>
-              </a:defRPr>
-            </a:lvl6pPr>
-            <a:lvl7pPr marL="2743200" indent="0" algn="ctr" defTabSz="914400" rtl="0" eaLnBrk="1" latinLnBrk="0" hangingPunct="1">
-              <a:lnSpc>
-                <a:spcPct val="90000"/>
-              </a:lnSpc>
-              <a:spcBef>
-                <a:spcPts val="500"/>
-              </a:spcBef>
-              <a:buFont typeface="Arial"/>
-              <a:buNone/>
-              <a:defRPr sz="1600" kern="1200">
-                <a:solidFill>
-                  <a:schemeClr val="tx1"/>
-                </a:solidFill>
-                <a:latin typeface="+mn-lt"/>
-                <a:ea typeface="+mn-ea"/>
-                <a:cs typeface="+mn-cs"/>
-              </a:defRPr>
-            </a:lvl7pPr>
-            <a:lvl8pPr marL="3200400" indent="0" algn="ctr" defTabSz="914400" rtl="0" eaLnBrk="1" latinLnBrk="0" hangingPunct="1">
-              <a:lnSpc>
-                <a:spcPct val="90000"/>
-              </a:lnSpc>
-              <a:spcBef>
-                <a:spcPts val="500"/>
-              </a:spcBef>
-              <a:buFont typeface="Arial"/>
-              <a:buNone/>
-              <a:defRPr sz="1600" kern="1200">
-                <a:solidFill>
-                  <a:schemeClr val="tx1"/>
-                </a:solidFill>
-                <a:latin typeface="+mn-lt"/>
-                <a:ea typeface="+mn-ea"/>
-                <a:cs typeface="+mn-cs"/>
-              </a:defRPr>
-            </a:lvl8pPr>
-            <a:lvl9pPr marL="3657600" indent="0" algn="ctr" defTabSz="914400" rtl="0" eaLnBrk="1" latinLnBrk="0" hangingPunct="1">
-              <a:lnSpc>
-                <a:spcPct val="90000"/>
-              </a:lnSpc>
-              <a:spcBef>
-                <a:spcPts val="500"/>
-              </a:spcBef>
-              <a:buFont typeface="Arial"/>
-              <a:buNone/>
-              <a:defRPr sz="1600" kern="1200">
-                <a:solidFill>
-                  <a:schemeClr val="tx1"/>
-                </a:solidFill>
-                <a:latin typeface="+mn-lt"/>
-                <a:ea typeface="+mn-ea"/>
-                <a:cs typeface="+mn-cs"/>
-              </a:defRPr>
-            </a:lvl9pPr>
-          </a:lstStyle>
-          <a:p>
-            <a:pPr algn="l"/>
-            <a:r>
-              <a:rPr lang="en-US" sz="2500" dirty="0" smtClean="0"/>
-              <a:t>Group Members: Roman Sul, Katelyn Suhr, Matthew Wirtz, Huanlei Wu</a:t>
-            </a:r>
-            <a:endParaRPr lang="en-US" sz="2500" dirty="0"/>
+          <a:bodyPr/>
+          <a:lstStyle/>
+          <a:p>
+            <a:r>
+              <a:rPr lang="en-US" dirty="0">
+                <a:latin typeface="Britannic Bold" panose="020B0903060703020204" pitchFamily="34" charset="0"/>
+              </a:rPr>
+              <a:t>Roman Sul, Katelyn Suhr, Matthew Wirtz, Huanlei Wu</a:t>
+            </a:r>
+          </a:p>
+          <a:p>
+            <a:endParaRPr lang="en-US" dirty="0">
+              <a:latin typeface="Britannic Bold" panose="020B0903060703020204" pitchFamily="34" charset="0"/>
+            </a:endParaRPr>
           </a:p>
         </p:txBody>
       </p:sp>
     </p:spTree>
     <p:extLst>
       <p:ext uri="{BB962C8B-B14F-4D97-AF65-F5344CB8AC3E}">
-        <p14:creationId xmlns:p14="http://schemas.microsoft.com/office/powerpoint/2010/main" val="1273225721"/>
+        <p14:creationId xmlns:p14="http://schemas.microsoft.com/office/powerpoint/2010/main" val="427365323"/>
       </p:ext>
     </p:extLst>
   </p:cSld>
   <p:clrMapOvr>
     <a:masterClrMapping/>
   </p:clrMapOvr>
-  <p:timing>
-    <p:tnLst>
-      <p:par>
-        <p:cTn id="1" dur="indefinite" restart="never" nodeType="tmRoot"/>
-      </p:par>
-    </p:tnLst>
-  </p:timing>
 </p:sld>
 </file>
 
@@ -3345,156 +3075,289 @@
             <a:spLocks noGrp="1"/>
           </p:cNvSpPr>
           <p:nvPr>
-            <p:ph type="title"/>
-          </p:nvPr>
-        </p:nvSpPr>
-        <p:spPr/>
-        <p:txBody>
-          <a:bodyPr/>
-          <a:lstStyle/>
-          <a:p>
-            <a:r>
-              <a:rPr lang="en-US" dirty="0" smtClean="0"/>
-              <a:t>Data Sources</a:t>
-            </a:r>
-            <a:endParaRPr lang="en-US" dirty="0"/>
-          </a:p>
-        </p:txBody>
-      </p:sp>
-      <p:sp>
-        <p:nvSpPr>
-          <p:cNvPr id="3" name="Content Placeholder 2"/>
-          <p:cNvSpPr>
-            <a:spLocks noGrp="1"/>
-          </p:cNvSpPr>
-          <p:nvPr>
-            <p:ph idx="1"/>
-          </p:nvPr>
-        </p:nvSpPr>
-        <p:spPr/>
+            <p:ph type="ctrTitle"/>
+          </p:nvPr>
+        </p:nvSpPr>
+        <p:spPr>
+          <a:xfrm>
+            <a:off x="1143000" y="207286"/>
+            <a:ext cx="9906000" cy="1631576"/>
+          </a:xfrm>
+        </p:spPr>
+        <p:txBody>
+          <a:bodyPr>
+            <a:normAutofit/>
+          </a:bodyPr>
+          <a:lstStyle/>
+          <a:p>
+            <a:pPr algn="l"/>
+            <a:r>
+              <a:rPr lang="en-US" sz="6200" dirty="0"/>
+              <a:t>Questions</a:t>
+            </a:r>
+          </a:p>
+        </p:txBody>
+      </p:sp>
+      <p:sp>
+        <p:nvSpPr>
+          <p:cNvPr id="3" name="Subtitle 2"/>
+          <p:cNvSpPr>
+            <a:spLocks noGrp="1"/>
+          </p:cNvSpPr>
+          <p:nvPr>
+            <p:ph type="subTitle" idx="1"/>
+          </p:nvPr>
+        </p:nvSpPr>
+        <p:spPr>
+          <a:xfrm>
+            <a:off x="1313043" y="2768044"/>
+            <a:ext cx="9565914" cy="2801566"/>
+          </a:xfrm>
+        </p:spPr>
         <p:txBody>
           <a:bodyPr>
             <a:noAutofit/>
           </a:bodyPr>
           <a:lstStyle/>
           <a:p>
+            <a:pPr marL="342900" indent="-342900" algn="l">
+              <a:buFont typeface="Arial" charset="0"/>
+              <a:buChar char="•"/>
+            </a:pPr>
             <a:r>
               <a:rPr lang="en-US" sz="2500" dirty="0"/>
-              <a:t>Syria </a:t>
-            </a:r>
-            <a:r>
-              <a:rPr lang="en-US" sz="2500" dirty="0" err="1" smtClean="0"/>
-              <a:t>Shapefiles</a:t>
-            </a:r>
+              <a:t>What are the patterns of casualties and migration of the Syrian Civil War?</a:t>
+            </a:r>
+          </a:p>
+          <a:p>
+            <a:pPr marL="342900" indent="-342900" algn="l">
+              <a:buFont typeface="Arial" charset="0"/>
+              <a:buChar char="•"/>
+            </a:pPr>
             <a:r>
               <a:rPr lang="en-US" sz="2500" dirty="0"/>
-              <a:t>:</a:t>
-            </a:r>
-            <a:r>
-              <a:rPr lang="en-US" sz="2500" dirty="0" smtClean="0"/>
-              <a:t> </a:t>
-            </a:r>
-            <a:r>
-              <a:rPr lang="en-US" sz="2500" u="sng" dirty="0">
-                <a:hlinkClick r:id="rId2"/>
-              </a:rPr>
-              <a:t>https://</a:t>
-            </a:r>
-            <a:r>
-              <a:rPr lang="en-US" sz="2500" u="sng" dirty="0" smtClean="0">
-                <a:hlinkClick r:id="rId2"/>
-              </a:rPr>
-              <a:t>data.humdata.org/dataset/356a63e9-90aa-4b9c-a938-58ef24469c00</a:t>
-            </a:r>
-            <a:endParaRPr lang="en-US" sz="2500" u="sng" dirty="0" smtClean="0"/>
-          </a:p>
-          <a:p>
+              <a:t>Can we identify major events that correspond to these patterns?</a:t>
+            </a:r>
+          </a:p>
+          <a:p>
+            <a:pPr marL="342900" indent="-342900" algn="l">
+              <a:buFont typeface="Arial" charset="0"/>
+              <a:buChar char="•"/>
+            </a:pPr>
             <a:r>
               <a:rPr lang="en-US" sz="2500" dirty="0"/>
-              <a:t>The UN Refugee Agency Data: </a:t>
-            </a:r>
-            <a:r>
-              <a:rPr lang="en-US" sz="2500" u="sng" dirty="0">
-                <a:hlinkClick r:id="rId3"/>
-              </a:rPr>
-              <a:t>http://popstats.unhcr.org/en/asylum_seekers_monthly</a:t>
-            </a:r>
-            <a:endParaRPr lang="en-US" sz="2500" dirty="0"/>
-          </a:p>
-          <a:p>
+              <a:t>Where are civilians seeking refuge?</a:t>
+            </a:r>
+          </a:p>
+          <a:p>
+            <a:pPr marL="342900" indent="-342900" algn="l">
+              <a:buFont typeface="Arial" charset="0"/>
+              <a:buChar char="•"/>
+            </a:pPr>
             <a:r>
               <a:rPr lang="en-US" sz="2500" dirty="0"/>
-              <a:t>A More In-Depth UN Refugee Agency Data: </a:t>
-            </a:r>
-            <a:r>
-              <a:rPr lang="en-US" sz="2500" u="sng" dirty="0">
-                <a:hlinkClick r:id="rId4"/>
-              </a:rPr>
-              <a:t>https://data.world/unhcr/e2d5566d-d755-40dd-a63f-d4d298a9df1d/workspace/file?filename=unhcr-persons-of-concern-origin-syr-csv-1.csv</a:t>
-            </a:r>
-            <a:endParaRPr lang="en-US" sz="2500" dirty="0"/>
-          </a:p>
-          <a:p>
+              <a:t>How do provincial casualties change with time?</a:t>
+            </a:r>
+          </a:p>
+          <a:p>
+            <a:pPr marL="342900" indent="-342900" algn="l">
+              <a:buFont typeface="Arial" charset="0"/>
+              <a:buChar char="•"/>
+            </a:pPr>
             <a:r>
               <a:rPr lang="en-US" sz="2500" dirty="0"/>
-              <a:t>Violations Documentation Center in Syria (VDC</a:t>
-            </a:r>
-            <a:r>
-              <a:rPr lang="en-US" sz="2500" dirty="0" smtClean="0"/>
-              <a:t>):</a:t>
-            </a:r>
-            <a:r>
-              <a:rPr lang="en-US" sz="2500" u="sng" dirty="0">
-                <a:hlinkClick r:id="rId5"/>
-              </a:rPr>
-              <a:t> </a:t>
-            </a:r>
-            <a:r>
-              <a:rPr lang="en-US" sz="2500" u="sng" dirty="0" smtClean="0">
-                <a:hlinkClick r:id="rId5"/>
-              </a:rPr>
-              <a:t>http</a:t>
-            </a:r>
-            <a:r>
-              <a:rPr lang="en-US" sz="2500" u="sng" dirty="0">
-                <a:hlinkClick r:id="rId5"/>
-              </a:rPr>
-              <a:t>://www.vdc-sy.info</a:t>
-            </a:r>
-            <a:r>
-              <a:rPr lang="en-US" sz="2500" dirty="0"/>
-              <a:t> </a:t>
-            </a:r>
-            <a:endParaRPr lang="en-US" sz="2500" dirty="0" smtClean="0"/>
-          </a:p>
-          <a:p>
-            <a:r>
-              <a:rPr lang="en-US" sz="2500" dirty="0"/>
-              <a:t>Syrian Center for Statistics and Research (CSR): </a:t>
-            </a:r>
-            <a:r>
-              <a:rPr lang="en-US" sz="2500" u="sng" dirty="0">
-                <a:hlinkClick r:id="rId6"/>
-              </a:rPr>
-              <a:t>https://csr-sy.org/</a:t>
-            </a:r>
-            <a:endParaRPr lang="en-US" sz="2500" dirty="0"/>
-          </a:p>
-          <a:p>
-            <a:r>
-              <a:rPr lang="en-US" sz="2500" dirty="0" err="1"/>
-              <a:t>Plotly</a:t>
-            </a:r>
-            <a:r>
-              <a:rPr lang="en-US" sz="2500" dirty="0"/>
-              <a:t> Country Codes: </a:t>
-            </a:r>
-            <a:r>
-              <a:rPr lang="en-US" sz="2500" u="sng" dirty="0">
-                <a:hlinkClick r:id="rId7"/>
-              </a:rPr>
-              <a:t>https://www.kaggle.com/shep312/plotlycountrycodes</a:t>
-            </a:r>
+              <a:t>What forms of violence are taking place?</a:t>
+            </a:r>
+          </a:p>
+        </p:txBody>
+      </p:sp>
+      <p:sp>
+        <p:nvSpPr>
+          <p:cNvPr id="5" name="Subtitle 2"/>
+          <p:cNvSpPr txBox="1">
+            <a:spLocks/>
+          </p:cNvSpPr>
+          <p:nvPr/>
+        </p:nvSpPr>
+        <p:spPr>
+          <a:xfrm>
+            <a:off x="528345" y="2035451"/>
+            <a:ext cx="9403213" cy="511193"/>
+          </a:xfrm>
+          <a:prstGeom prst="rect">
+            <a:avLst/>
+          </a:prstGeom>
+        </p:spPr>
+        <p:txBody>
+          <a:bodyPr vert="horz" lIns="91440" tIns="45720" rIns="91440" bIns="45720" rtlCol="0">
+            <a:normAutofit/>
+          </a:bodyPr>
+          <a:lstStyle>
+            <a:lvl1pPr marL="0" indent="0" algn="ctr" defTabSz="914400" rtl="0" eaLnBrk="1" latinLnBrk="0" hangingPunct="1">
+              <a:lnSpc>
+                <a:spcPct val="90000"/>
+              </a:lnSpc>
+              <a:spcBef>
+                <a:spcPts val="1000"/>
+              </a:spcBef>
+              <a:buFont typeface="Arial"/>
+              <a:buNone/>
+              <a:defRPr sz="2400" kern="1200">
+                <a:solidFill>
+                  <a:schemeClr val="tx1"/>
+                </a:solidFill>
+                <a:latin typeface="+mn-lt"/>
+                <a:ea typeface="+mn-ea"/>
+                <a:cs typeface="+mn-cs"/>
+              </a:defRPr>
+            </a:lvl1pPr>
+            <a:lvl2pPr marL="457200" indent="0" algn="ctr" defTabSz="914400" rtl="0" eaLnBrk="1" latinLnBrk="0" hangingPunct="1">
+              <a:lnSpc>
+                <a:spcPct val="90000"/>
+              </a:lnSpc>
+              <a:spcBef>
+                <a:spcPts val="500"/>
+              </a:spcBef>
+              <a:buFont typeface="Arial"/>
+              <a:buNone/>
+              <a:defRPr sz="2000" kern="1200">
+                <a:solidFill>
+                  <a:schemeClr val="tx1"/>
+                </a:solidFill>
+                <a:latin typeface="+mn-lt"/>
+                <a:ea typeface="+mn-ea"/>
+                <a:cs typeface="+mn-cs"/>
+              </a:defRPr>
+            </a:lvl2pPr>
+            <a:lvl3pPr marL="914400" indent="0" algn="ctr" defTabSz="914400" rtl="0" eaLnBrk="1" latinLnBrk="0" hangingPunct="1">
+              <a:lnSpc>
+                <a:spcPct val="90000"/>
+              </a:lnSpc>
+              <a:spcBef>
+                <a:spcPts val="500"/>
+              </a:spcBef>
+              <a:buFont typeface="Arial"/>
+              <a:buNone/>
+              <a:defRPr sz="1800" kern="1200">
+                <a:solidFill>
+                  <a:schemeClr val="tx1"/>
+                </a:solidFill>
+                <a:latin typeface="+mn-lt"/>
+                <a:ea typeface="+mn-ea"/>
+                <a:cs typeface="+mn-cs"/>
+              </a:defRPr>
+            </a:lvl3pPr>
+            <a:lvl4pPr marL="1371600" indent="0" algn="ctr" defTabSz="914400" rtl="0" eaLnBrk="1" latinLnBrk="0" hangingPunct="1">
+              <a:lnSpc>
+                <a:spcPct val="90000"/>
+              </a:lnSpc>
+              <a:spcBef>
+                <a:spcPts val="500"/>
+              </a:spcBef>
+              <a:buFont typeface="Arial"/>
+              <a:buNone/>
+              <a:defRPr sz="1600" kern="1200">
+                <a:solidFill>
+                  <a:schemeClr val="tx1"/>
+                </a:solidFill>
+                <a:latin typeface="+mn-lt"/>
+                <a:ea typeface="+mn-ea"/>
+                <a:cs typeface="+mn-cs"/>
+              </a:defRPr>
+            </a:lvl4pPr>
+            <a:lvl5pPr marL="1828800" indent="0" algn="ctr" defTabSz="914400" rtl="0" eaLnBrk="1" latinLnBrk="0" hangingPunct="1">
+              <a:lnSpc>
+                <a:spcPct val="90000"/>
+              </a:lnSpc>
+              <a:spcBef>
+                <a:spcPts val="500"/>
+              </a:spcBef>
+              <a:buFont typeface="Arial"/>
+              <a:buNone/>
+              <a:defRPr sz="1600" kern="1200">
+                <a:solidFill>
+                  <a:schemeClr val="tx1"/>
+                </a:solidFill>
+                <a:latin typeface="+mn-lt"/>
+                <a:ea typeface="+mn-ea"/>
+                <a:cs typeface="+mn-cs"/>
+              </a:defRPr>
+            </a:lvl5pPr>
+            <a:lvl6pPr marL="2286000" indent="0" algn="ctr" defTabSz="914400" rtl="0" eaLnBrk="1" latinLnBrk="0" hangingPunct="1">
+              <a:lnSpc>
+                <a:spcPct val="90000"/>
+              </a:lnSpc>
+              <a:spcBef>
+                <a:spcPts val="500"/>
+              </a:spcBef>
+              <a:buFont typeface="Arial"/>
+              <a:buNone/>
+              <a:defRPr sz="1600" kern="1200">
+                <a:solidFill>
+                  <a:schemeClr val="tx1"/>
+                </a:solidFill>
+                <a:latin typeface="+mn-lt"/>
+                <a:ea typeface="+mn-ea"/>
+                <a:cs typeface="+mn-cs"/>
+              </a:defRPr>
+            </a:lvl6pPr>
+            <a:lvl7pPr marL="2743200" indent="0" algn="ctr" defTabSz="914400" rtl="0" eaLnBrk="1" latinLnBrk="0" hangingPunct="1">
+              <a:lnSpc>
+                <a:spcPct val="90000"/>
+              </a:lnSpc>
+              <a:spcBef>
+                <a:spcPts val="500"/>
+              </a:spcBef>
+              <a:buFont typeface="Arial"/>
+              <a:buNone/>
+              <a:defRPr sz="1600" kern="1200">
+                <a:solidFill>
+                  <a:schemeClr val="tx1"/>
+                </a:solidFill>
+                <a:latin typeface="+mn-lt"/>
+                <a:ea typeface="+mn-ea"/>
+                <a:cs typeface="+mn-cs"/>
+              </a:defRPr>
+            </a:lvl7pPr>
+            <a:lvl8pPr marL="3200400" indent="0" algn="ctr" defTabSz="914400" rtl="0" eaLnBrk="1" latinLnBrk="0" hangingPunct="1">
+              <a:lnSpc>
+                <a:spcPct val="90000"/>
+              </a:lnSpc>
+              <a:spcBef>
+                <a:spcPts val="500"/>
+              </a:spcBef>
+              <a:buFont typeface="Arial"/>
+              <a:buNone/>
+              <a:defRPr sz="1600" kern="1200">
+                <a:solidFill>
+                  <a:schemeClr val="tx1"/>
+                </a:solidFill>
+                <a:latin typeface="+mn-lt"/>
+                <a:ea typeface="+mn-ea"/>
+                <a:cs typeface="+mn-cs"/>
+              </a:defRPr>
+            </a:lvl8pPr>
+            <a:lvl9pPr marL="3657600" indent="0" algn="ctr" defTabSz="914400" rtl="0" eaLnBrk="1" latinLnBrk="0" hangingPunct="1">
+              <a:lnSpc>
+                <a:spcPct val="90000"/>
+              </a:lnSpc>
+              <a:spcBef>
+                <a:spcPts val="500"/>
+              </a:spcBef>
+              <a:buFont typeface="Arial"/>
+              <a:buNone/>
+              <a:defRPr sz="1600" kern="1200">
+                <a:solidFill>
+                  <a:schemeClr val="tx1"/>
+                </a:solidFill>
+                <a:latin typeface="+mn-lt"/>
+                <a:ea typeface="+mn-ea"/>
+                <a:cs typeface="+mn-cs"/>
+              </a:defRPr>
+            </a:lvl9pPr>
+          </a:lstStyle>
+          <a:p>
+            <a:pPr algn="l"/>
             <a:endParaRPr lang="en-US" sz="2500" dirty="0"/>
           </a:p>
         </p:txBody>
@@ -3502,20 +3365,13 @@
     </p:spTree>
     <p:extLst>
       <p:ext uri="{BB962C8B-B14F-4D97-AF65-F5344CB8AC3E}">
-        <p14:creationId xmlns:p14="http://schemas.microsoft.com/office/powerpoint/2010/main" val="1491090621"/>
+        <p14:creationId xmlns:p14="http://schemas.microsoft.com/office/powerpoint/2010/main" val="1273225721"/>
       </p:ext>
     </p:extLst>
   </p:cSld>
   <p:clrMapOvr>
     <a:masterClrMapping/>
   </p:clrMapOvr>
-  <p:timing>
-    <p:tnLst>
-      <p:par>
-        <p:cTn id="1" dur="indefinite" restart="never" nodeType="tmRoot"/>
-      </p:par>
-    </p:tnLst>
-  </p:timing>
 </p:sld>
 </file>
 
@@ -3548,152 +3404,139 @@
         </p:nvSpPr>
         <p:spPr/>
         <p:txBody>
-          <a:bodyPr/>
-          <a:lstStyle/>
-          <a:p>
-            <a:r>
-              <a:rPr lang="en-US" dirty="0"/>
-              <a:t>Code and Visualization References </a:t>
-            </a:r>
-            <a:endParaRPr lang="en-US" dirty="0"/>
-          </a:p>
-        </p:txBody>
-      </p:sp>
-      <p:sp>
-        <p:nvSpPr>
-          <p:cNvPr id="3" name="Content Placeholder 2"/>
-          <p:cNvSpPr>
-            <a:spLocks noGrp="1"/>
-          </p:cNvSpPr>
-          <p:nvPr>
-            <p:ph idx="1"/>
-          </p:nvPr>
-        </p:nvSpPr>
-        <p:spPr/>
-        <p:txBody>
           <a:bodyPr>
             <a:normAutofit/>
           </a:bodyPr>
           <a:lstStyle/>
           <a:p>
             <a:r>
+              <a:rPr lang="en-US" sz="6200" dirty="0"/>
+              <a:t>Data Sources</a:t>
+            </a:r>
+          </a:p>
+        </p:txBody>
+      </p:sp>
+      <p:sp>
+        <p:nvSpPr>
+          <p:cNvPr id="3" name="Content Placeholder 2"/>
+          <p:cNvSpPr>
+            <a:spLocks noGrp="1"/>
+          </p:cNvSpPr>
+          <p:nvPr>
+            <p:ph idx="1"/>
+          </p:nvPr>
+        </p:nvSpPr>
+        <p:spPr/>
+        <p:txBody>
+          <a:bodyPr>
+            <a:noAutofit/>
+          </a:bodyPr>
+          <a:lstStyle/>
+          <a:p>
+            <a:r>
               <a:rPr lang="en-US" sz="2500" dirty="0"/>
-              <a:t>understanding </a:t>
+              <a:t>Syria </a:t>
             </a:r>
             <a:r>
               <a:rPr lang="en-US" sz="2500" dirty="0" err="1"/>
-              <a:t>plotly</a:t>
+              <a:t>Shapefiles</a:t>
             </a:r>
             <a:r>
               <a:rPr lang="en-US" sz="2500" dirty="0"/>
-              <a:t> and adding a slider: </a:t>
+              <a:t>: </a:t>
             </a:r>
             <a:r>
               <a:rPr lang="en-US" sz="2500" u="sng" dirty="0">
                 <a:hlinkClick r:id="rId2"/>
               </a:rPr>
-              <a:t>https://</a:t>
-            </a:r>
-            <a:r>
-              <a:rPr lang="en-US" sz="2500" u="sng" dirty="0" smtClean="0">
-                <a:hlinkClick r:id="rId2"/>
-              </a:rPr>
-              <a:t>community.periscopedata.com/t/36nz2s/plotly-choropleth-with-slider-map-charts-over-time</a:t>
-            </a:r>
+              <a:t>https://data.humdata.org/dataset/356a63e9-90aa-4b9c-a938-58ef24469c00</a:t>
+            </a:r>
+            <a:endParaRPr lang="en-US" sz="2500" u="sng" dirty="0"/>
+          </a:p>
+          <a:p>
             <a:r>
               <a:rPr lang="en-US" sz="2500" dirty="0"/>
-              <a:t> </a:t>
-            </a:r>
-            <a:r>
-              <a:rPr lang="en-US" sz="2500" dirty="0" smtClean="0"/>
-              <a:t>&amp; </a:t>
+              <a:t>The UN Refugee Agency Data: </a:t>
             </a:r>
             <a:r>
               <a:rPr lang="en-US" sz="2500" u="sng" dirty="0">
                 <a:hlinkClick r:id="rId3"/>
               </a:rPr>
-              <a:t>https://plot.ly/python/scattermapbox</a:t>
-            </a:r>
-            <a:r>
-              <a:rPr lang="en-US" sz="2500" u="sng" dirty="0" smtClean="0">
-                <a:hlinkClick r:id="rId3"/>
-              </a:rPr>
-              <a:t>/</a:t>
-            </a:r>
-            <a:endParaRPr lang="en-US" sz="2500" u="sng" dirty="0" smtClean="0"/>
+              <a:t>http://popstats.unhcr.org/en/asylum_seekers_monthly</a:t>
+            </a:r>
+            <a:endParaRPr lang="en-US" sz="2500" dirty="0"/>
           </a:p>
           <a:p>
             <a:r>
               <a:rPr lang="en-US" sz="2500" dirty="0"/>
-              <a:t>understanding </a:t>
-            </a:r>
-            <a:r>
-              <a:rPr lang="en-US" sz="2500" dirty="0" err="1"/>
-              <a:t>bokeh</a:t>
-            </a:r>
-            <a:r>
-              <a:rPr lang="en-US" sz="2500" dirty="0"/>
-              <a:t> and adding a slider: </a:t>
+              <a:t>A More In-Depth UN Refugee Agency Data: </a:t>
             </a:r>
             <a:r>
               <a:rPr lang="en-US" sz="2500" u="sng" dirty="0">
                 <a:hlinkClick r:id="rId4"/>
               </a:rPr>
-              <a:t>https://pythonawesome.com/bokeh-plotting-backend-for-pandas-and-geopandas/</a:t>
+              <a:t>https://data.world/unhcr/e2d5566d-d755-40dd-a63f-d4d298a9df1d/workspace/file?filename=unhcr-persons-of-concern-origin-syr-csv-1.csv</a:t>
             </a:r>
             <a:endParaRPr lang="en-US" sz="2500" dirty="0"/>
           </a:p>
           <a:p>
             <a:r>
               <a:rPr lang="en-US" sz="2500" dirty="0"/>
-              <a:t>changing pandas </a:t>
-            </a:r>
-            <a:r>
-              <a:rPr lang="en-US" sz="2500" dirty="0" err="1"/>
-              <a:t>dataframe</a:t>
-            </a:r>
-            <a:r>
-              <a:rPr lang="en-US" sz="2500" dirty="0"/>
-              <a:t> to geo </a:t>
-            </a:r>
-            <a:r>
-              <a:rPr lang="en-US" sz="2500" dirty="0" err="1"/>
-              <a:t>dataframe</a:t>
-            </a:r>
-            <a:r>
-              <a:rPr lang="en-US" sz="2500" dirty="0"/>
-              <a:t>: </a:t>
+              <a:t>Violations Documentation Center in Syria (VDC):</a:t>
             </a:r>
             <a:r>
               <a:rPr lang="en-US" sz="2500" u="sng" dirty="0">
                 <a:hlinkClick r:id="rId5"/>
               </a:rPr>
-              <a:t>https://gis.stackexchange.com/questions/174159/convert-a-pandas-dataframe-to-a-geodataframe</a:t>
+              <a:t> http://www.vdc-sy.info</a:t>
+            </a:r>
+            <a:r>
+              <a:rPr lang="en-US" sz="2500" dirty="0"/>
+              <a:t> </a:t>
+            </a:r>
+          </a:p>
+          <a:p>
+            <a:r>
+              <a:rPr lang="en-US" sz="2500" dirty="0"/>
+              <a:t>Syrian Center for Statistics and Research (CSR): </a:t>
+            </a:r>
+            <a:r>
+              <a:rPr lang="en-US" sz="2500" u="sng" dirty="0">
+                <a:hlinkClick r:id="rId6"/>
+              </a:rPr>
+              <a:t>https://csr-sy.org/</a:t>
             </a:r>
             <a:endParaRPr lang="en-US" sz="2500" dirty="0"/>
           </a:p>
           <a:p>
-            <a:endParaRPr lang="en-US" sz="2000" dirty="0"/>
+            <a:r>
+              <a:rPr lang="en-US" sz="2500" dirty="0" err="1"/>
+              <a:t>Plotly</a:t>
+            </a:r>
+            <a:r>
+              <a:rPr lang="en-US" sz="2500" dirty="0"/>
+              <a:t> Country Codes: </a:t>
+            </a:r>
+            <a:r>
+              <a:rPr lang="en-US" sz="2500" u="sng" dirty="0">
+                <a:hlinkClick r:id="rId7"/>
+              </a:rPr>
+              <a:t>https://www.kaggle.com/shep312/plotlycountrycodes</a:t>
+            </a:r>
+            <a:endParaRPr lang="en-US" sz="2500" dirty="0"/>
           </a:p>
         </p:txBody>
       </p:sp>
     </p:spTree>
     <p:extLst>
       <p:ext uri="{BB962C8B-B14F-4D97-AF65-F5344CB8AC3E}">
-        <p14:creationId xmlns:p14="http://schemas.microsoft.com/office/powerpoint/2010/main" val="472044330"/>
+        <p14:creationId xmlns:p14="http://schemas.microsoft.com/office/powerpoint/2010/main" val="1491090621"/>
       </p:ext>
     </p:extLst>
   </p:cSld>
   <p:clrMapOvr>
     <a:masterClrMapping/>
   </p:clrMapOvr>
-  <p:timing>
-    <p:tnLst>
-      <p:par>
-        <p:cTn id="1" dur="indefinite" restart="never" nodeType="tmRoot"/>
-      </p:par>
-    </p:tnLst>
-  </p:timing>
 </p:sld>
 </file>
 
@@ -3726,14 +3569,15 @@
         </p:nvSpPr>
         <p:spPr/>
         <p:txBody>
-          <a:bodyPr/>
-          <a:lstStyle/>
-          <a:p>
-            <a:r>
-              <a:rPr lang="en-US" dirty="0" smtClean="0"/>
-              <a:t>Final Results</a:t>
-            </a:r>
-            <a:endParaRPr lang="en-US" dirty="0"/>
+          <a:bodyPr>
+            <a:noAutofit/>
+          </a:bodyPr>
+          <a:lstStyle/>
+          <a:p>
+            <a:r>
+              <a:rPr lang="en-US" sz="5500" dirty="0"/>
+              <a:t>Code and Visualization References </a:t>
+            </a:r>
           </a:p>
         </p:txBody>
       </p:sp>
@@ -3754,27 +3598,101 @@
           </a:bodyPr>
           <a:lstStyle/>
           <a:p>
+            <a:r>
+              <a:rPr lang="en-US" sz="2500" dirty="0"/>
+              <a:t>understanding </a:t>
+            </a:r>
+            <a:r>
+              <a:rPr lang="en-US" sz="2500" dirty="0" err="1"/>
+              <a:t>plotly</a:t>
+            </a:r>
+            <a:r>
+              <a:rPr lang="en-US" sz="2500" dirty="0"/>
+              <a:t> and adding a slider: </a:t>
+            </a:r>
+            <a:r>
+              <a:rPr lang="en-US" sz="2500" u="sng" dirty="0">
+                <a:hlinkClick r:id="rId2"/>
+              </a:rPr>
+              <a:t>https://community.periscopedata.com/t/36nz2s/plotly-choropleth-with-slider-map-charts-over-time</a:t>
+            </a:r>
+            <a:r>
+              <a:rPr lang="en-US" sz="2500" dirty="0"/>
+              <a:t> &amp; </a:t>
+            </a:r>
+            <a:r>
+              <a:rPr lang="en-US" sz="2500" u="sng" dirty="0">
+                <a:hlinkClick r:id="rId3"/>
+              </a:rPr>
+              <a:t>https://plot.ly/python/scattermapbox/</a:t>
+            </a:r>
+            <a:endParaRPr lang="en-US" sz="2500" u="sng" dirty="0"/>
+          </a:p>
+          <a:p>
+            <a:r>
+              <a:rPr lang="en-US" sz="2500" dirty="0"/>
+              <a:t>understanding </a:t>
+            </a:r>
+            <a:r>
+              <a:rPr lang="en-US" sz="2500" dirty="0" err="1"/>
+              <a:t>bokeh</a:t>
+            </a:r>
+            <a:r>
+              <a:rPr lang="en-US" sz="2500" dirty="0"/>
+              <a:t> and adding a slider: </a:t>
+            </a:r>
+            <a:r>
+              <a:rPr lang="en-US" sz="2500" u="sng" dirty="0">
+                <a:hlinkClick r:id="rId4"/>
+              </a:rPr>
+              <a:t>https://pythonawesome.com/bokeh-plotting-backend-for-pandas-and-geopandas/</a:t>
+            </a:r>
             <a:endParaRPr lang="en-US" sz="2500" dirty="0"/>
+          </a:p>
+          <a:p>
+            <a:r>
+              <a:rPr lang="en-US" sz="2500" dirty="0"/>
+              <a:t>changing pandas </a:t>
+            </a:r>
+            <a:r>
+              <a:rPr lang="en-US" sz="2500" dirty="0" err="1"/>
+              <a:t>dataframe</a:t>
+            </a:r>
+            <a:r>
+              <a:rPr lang="en-US" sz="2500" dirty="0"/>
+              <a:t> to geo </a:t>
+            </a:r>
+            <a:r>
+              <a:rPr lang="en-US" sz="2500" dirty="0" err="1"/>
+              <a:t>dataframe</a:t>
+            </a:r>
+            <a:r>
+              <a:rPr lang="en-US" sz="2500" dirty="0"/>
+              <a:t>: </a:t>
+            </a:r>
+            <a:r>
+              <a:rPr lang="en-US" sz="2500" u="sng" dirty="0">
+                <a:hlinkClick r:id="rId5"/>
+              </a:rPr>
+              <a:t>https://gis.stackexchange.com/questions/174159/convert-a-pandas-dataframe-to-a-geodataframe</a:t>
+            </a:r>
+            <a:endParaRPr lang="en-US" sz="2500" dirty="0"/>
+          </a:p>
+          <a:p>
+            <a:endParaRPr lang="en-US" sz="2000" dirty="0"/>
           </a:p>
         </p:txBody>
       </p:sp>
     </p:spTree>
     <p:extLst>
       <p:ext uri="{BB962C8B-B14F-4D97-AF65-F5344CB8AC3E}">
-        <p14:creationId xmlns:p14="http://schemas.microsoft.com/office/powerpoint/2010/main" val="893822644"/>
+        <p14:creationId xmlns:p14="http://schemas.microsoft.com/office/powerpoint/2010/main" val="472044330"/>
       </p:ext>
     </p:extLst>
   </p:cSld>
   <p:clrMapOvr>
     <a:masterClrMapping/>
   </p:clrMapOvr>
-  <p:timing>
-    <p:tnLst>
-      <p:par>
-        <p:cTn id="1" dur="indefinite" restart="never" nodeType="tmRoot"/>
-      </p:par>
-    </p:tnLst>
-  </p:timing>
 </p:sld>
 </file>
 
@@ -3807,116 +3725,201 @@
         </p:nvSpPr>
         <p:spPr/>
         <p:txBody>
-          <a:bodyPr/>
-          <a:lstStyle/>
-          <a:p>
-            <a:r>
-              <a:rPr lang="en-US" dirty="0" smtClean="0"/>
-              <a:t>Libraries, Tasks Accomplished, and Challenges</a:t>
-            </a:r>
-            <a:endParaRPr lang="en-US" dirty="0"/>
-          </a:p>
-        </p:txBody>
-      </p:sp>
-      <p:sp>
-        <p:nvSpPr>
-          <p:cNvPr id="3" name="Content Placeholder 2"/>
-          <p:cNvSpPr>
-            <a:spLocks noGrp="1"/>
-          </p:cNvSpPr>
-          <p:nvPr>
-            <p:ph idx="1"/>
-          </p:nvPr>
-        </p:nvSpPr>
-        <p:spPr/>
-        <p:txBody>
           <a:bodyPr>
             <a:normAutofit/>
           </a:bodyPr>
           <a:lstStyle/>
           <a:p>
             <a:r>
-              <a:rPr lang="en-US" sz="2500" dirty="0" smtClean="0"/>
-              <a:t>Libraries: pandas</a:t>
-            </a:r>
-            <a:r>
-              <a:rPr lang="en-US" sz="2500" dirty="0" smtClean="0"/>
+              <a:rPr lang="en-US" sz="6200" dirty="0"/>
+              <a:t>Final Results</a:t>
+            </a:r>
+          </a:p>
+        </p:txBody>
+      </p:sp>
+      <p:sp>
+        <p:nvSpPr>
+          <p:cNvPr id="3" name="Content Placeholder 2"/>
+          <p:cNvSpPr>
+            <a:spLocks noGrp="1"/>
+          </p:cNvSpPr>
+          <p:nvPr>
+            <p:ph idx="1"/>
+          </p:nvPr>
+        </p:nvSpPr>
+        <p:spPr/>
+        <p:txBody>
+          <a:bodyPr>
+            <a:normAutofit/>
+          </a:bodyPr>
+          <a:lstStyle/>
+          <a:p>
+            <a:r>
+              <a:rPr lang="en-US" sz="2500" dirty="0"/>
+              <a:t>Casualties have been dropping throughout the years since 2013</a:t>
+            </a:r>
+          </a:p>
+          <a:p>
+            <a:r>
+              <a:rPr lang="en-US" sz="2500" dirty="0"/>
+              <a:t>Damascus and Aleppo normally has the most casualties</a:t>
+            </a:r>
+          </a:p>
+          <a:p>
+            <a:endParaRPr lang="en-US" sz="2500" dirty="0"/>
+          </a:p>
+        </p:txBody>
+      </p:sp>
+    </p:spTree>
+    <p:extLst>
+      <p:ext uri="{BB962C8B-B14F-4D97-AF65-F5344CB8AC3E}">
+        <p14:creationId xmlns:p14="http://schemas.microsoft.com/office/powerpoint/2010/main" val="893822644"/>
+      </p:ext>
+    </p:extLst>
+  </p:cSld>
+  <p:clrMapOvr>
+    <a:masterClrMapping/>
+  </p:clrMapOvr>
+</p:sld>
+</file>
+
+<file path=ppt/slides/slide6.xml><?xml version="1.0" encoding="utf-8"?>
+<p:sld xmlns:a="http://schemas.openxmlformats.org/drawingml/2006/main" xmlns:r="http://schemas.openxmlformats.org/officeDocument/2006/relationships" xmlns:p="http://schemas.openxmlformats.org/presentationml/2006/main">
+  <p:cSld>
+    <p:spTree>
+      <p:nvGrpSpPr>
+        <p:cNvPr id="1" name=""/>
+        <p:cNvGrpSpPr/>
+        <p:nvPr/>
+      </p:nvGrpSpPr>
+      <p:grpSpPr>
+        <a:xfrm>
+          <a:off x="0" y="0"/>
+          <a:ext cx="0" cy="0"/>
+          <a:chOff x="0" y="0"/>
+          <a:chExt cx="0" cy="0"/>
+        </a:xfrm>
+      </p:grpSpPr>
+      <p:sp>
+        <p:nvSpPr>
+          <p:cNvPr id="2" name="Title 1"/>
+          <p:cNvSpPr>
+            <a:spLocks noGrp="1"/>
+          </p:cNvSpPr>
+          <p:nvPr>
+            <p:ph type="title"/>
+          </p:nvPr>
+        </p:nvSpPr>
+        <p:spPr/>
+        <p:txBody>
+          <a:bodyPr/>
+          <a:lstStyle/>
+          <a:p>
+            <a:r>
+              <a:rPr lang="en-US" dirty="0"/>
+              <a:t>Libraries, Tasks Accomplished, and Challenges</a:t>
+            </a:r>
+          </a:p>
+        </p:txBody>
+      </p:sp>
+      <p:sp>
+        <p:nvSpPr>
+          <p:cNvPr id="3" name="Content Placeholder 2"/>
+          <p:cNvSpPr>
+            <a:spLocks noGrp="1"/>
+          </p:cNvSpPr>
+          <p:nvPr>
+            <p:ph idx="1"/>
+          </p:nvPr>
+        </p:nvSpPr>
+        <p:spPr/>
+        <p:txBody>
+          <a:bodyPr>
+            <a:normAutofit/>
+          </a:bodyPr>
+          <a:lstStyle/>
+          <a:p>
+            <a:r>
+              <a:rPr lang="en-US" sz="2500" dirty="0"/>
+              <a:t>Libraries: pandas, </a:t>
+            </a:r>
+            <a:r>
+              <a:rPr lang="en-US" sz="2500" dirty="0" err="1"/>
+              <a:t>plotly</a:t>
+            </a:r>
+            <a:r>
+              <a:rPr lang="en-US" sz="2500" dirty="0"/>
+              <a:t>, pickle, </a:t>
+            </a:r>
+            <a:r>
+              <a:rPr lang="en-US" sz="2500" dirty="0" err="1"/>
+              <a:t>bokeh</a:t>
+            </a:r>
+            <a:r>
+              <a:rPr lang="en-US" sz="2500" dirty="0"/>
+              <a:t>, tor, </a:t>
+            </a:r>
+            <a:r>
+              <a:rPr lang="en-US" sz="2500" dirty="0" err="1"/>
+              <a:t>fake_useragent</a:t>
+            </a:r>
+            <a:r>
+              <a:rPr lang="en-US" sz="2500" dirty="0"/>
               <a:t>, </a:t>
             </a:r>
             <a:r>
-              <a:rPr lang="en-US" sz="2500" dirty="0" err="1" smtClean="0"/>
-              <a:t>plotly</a:t>
-            </a:r>
-            <a:r>
-              <a:rPr lang="en-US" sz="2500" dirty="0" smtClean="0"/>
+              <a:rPr lang="en-US" sz="2500" dirty="0" err="1"/>
+              <a:t>geopandas</a:t>
+            </a:r>
+            <a:r>
+              <a:rPr lang="en-US" sz="2500" dirty="0"/>
               <a:t>, </a:t>
             </a:r>
             <a:r>
-              <a:rPr lang="en-US" sz="2500" dirty="0" smtClean="0"/>
-              <a:t>pickle, </a:t>
-            </a:r>
-            <a:r>
-              <a:rPr lang="en-US" sz="2500" dirty="0" err="1" smtClean="0"/>
-              <a:t>bokeh</a:t>
-            </a:r>
-            <a:r>
-              <a:rPr lang="en-US" sz="2500" dirty="0" smtClean="0"/>
-              <a:t>, tor, </a:t>
-            </a:r>
-            <a:r>
-              <a:rPr lang="en-US" sz="2500" dirty="0" err="1" smtClean="0"/>
-              <a:t>fake_useragent</a:t>
-            </a:r>
-            <a:r>
-              <a:rPr lang="en-US" sz="2500" dirty="0" smtClean="0"/>
-              <a:t>, </a:t>
-            </a:r>
-            <a:r>
-              <a:rPr lang="en-US" sz="2500" dirty="0" err="1" smtClean="0"/>
-              <a:t>geopandas</a:t>
-            </a:r>
-            <a:r>
-              <a:rPr lang="en-US" sz="2500" dirty="0" smtClean="0"/>
-              <a:t>, </a:t>
-            </a:r>
-            <a:r>
-              <a:rPr lang="en-US" sz="2500" dirty="0" err="1" smtClean="0"/>
+              <a:rPr lang="en-US" sz="2500" dirty="0" err="1"/>
               <a:t>matplotlib</a:t>
             </a:r>
             <a:r>
-              <a:rPr lang="en-US" sz="2500" dirty="0" smtClean="0"/>
+              <a:rPr lang="en-US" sz="2500" dirty="0"/>
               <a:t>, beautiful soup</a:t>
             </a:r>
           </a:p>
           <a:p>
             <a:r>
-              <a:rPr lang="en-US" sz="2500" dirty="0" smtClean="0"/>
+              <a:rPr lang="en-US" sz="2500" dirty="0"/>
               <a:t>We were able to successfully scrape casualty and refugee data from 2011-2018 for each day</a:t>
             </a:r>
           </a:p>
           <a:p>
             <a:r>
-              <a:rPr lang="en-US" sz="2500" dirty="0" smtClean="0"/>
+              <a:rPr lang="en-US" sz="2500" dirty="0"/>
               <a:t>We then cleaned the data so it was useable in a </a:t>
             </a:r>
             <a:r>
-              <a:rPr lang="en-US" sz="2500" dirty="0" err="1" smtClean="0"/>
+              <a:rPr lang="en-US" sz="2500" dirty="0" err="1"/>
               <a:t>dataframe</a:t>
             </a:r>
-            <a:endParaRPr lang="en-US" sz="2500" dirty="0" smtClean="0"/>
-          </a:p>
-          <a:p>
-            <a:r>
-              <a:rPr lang="en-US" sz="2500" dirty="0" smtClean="0"/>
+            <a:endParaRPr lang="en-US" sz="2500" dirty="0"/>
+          </a:p>
+          <a:p>
+            <a:r>
+              <a:rPr lang="en-US" sz="2500" dirty="0"/>
               <a:t>And then visualized it to better understand the Syrian War conflict</a:t>
             </a:r>
           </a:p>
           <a:p>
             <a:r>
-              <a:rPr lang="en-US" sz="2500" dirty="0" smtClean="0"/>
-              <a:t>Challenges: manipulating tables, setting up dependencies, adapting visualization elements</a:t>
-            </a:r>
-            <a:endParaRPr lang="en-US" sz="2500" dirty="0"/>
+              <a:rPr lang="en-US" sz="2500" dirty="0"/>
+              <a:t>Challenges: converting immutable </a:t>
+            </a:r>
+            <a:r>
+              <a:rPr lang="en-US" sz="2500" dirty="0" err="1"/>
+              <a:t>dataframes</a:t>
+            </a:r>
+            <a:r>
+              <a:rPr lang="en-US" sz="2500" dirty="0"/>
+              <a:t>, manipulating tables, setting up dependencies, adapting visualization elements</a:t>
+            </a:r>
           </a:p>
         </p:txBody>
       </p:sp>
@@ -3930,13 +3933,6 @@
   <p:clrMapOvr>
     <a:masterClrMapping/>
   </p:clrMapOvr>
-  <p:timing>
-    <p:tnLst>
-      <p:par>
-        <p:cTn id="1" dur="indefinite" restart="never" nodeType="tmRoot"/>
-      </p:par>
-    </p:tnLst>
-  </p:timing>
 </p:sld>
 </file>
 

</xml_diff>

<commit_message>
added final results information to pptx
</commit_message>
<xml_diff>
--- a/FinalProjectPresentation.pptx
+++ b/FinalProjectPresentation.pptx
@@ -3760,13 +3760,49 @@
             </a:r>
           </a:p>
           <a:p>
+            <a:pPr marL="0" indent="0">
+              <a:buNone/>
+            </a:pPr>
+            <a:endParaRPr lang="en-US" sz="2500" dirty="0"/>
+          </a:p>
+          <a:p>
             <a:r>
               <a:rPr lang="en-US" sz="2500" dirty="0"/>
-              <a:t>Damascus and Aleppo normally has the most casualties</a:t>
-            </a:r>
-          </a:p>
-          <a:p>
+              <a:t>Damascus and Aleppo has the most casualties out of all the provinces</a:t>
+            </a:r>
+          </a:p>
+          <a:p>
+            <a:pPr marL="0" indent="0">
+              <a:buNone/>
+            </a:pPr>
             <a:endParaRPr lang="en-US" sz="2500" dirty="0"/>
+          </a:p>
+          <a:p>
+            <a:r>
+              <a:rPr lang="en-US" sz="2500" dirty="0"/>
+              <a:t>Turkey has the most refugees from Syria</a:t>
+            </a:r>
+          </a:p>
+          <a:p>
+            <a:pPr marL="0" indent="0">
+              <a:buNone/>
+            </a:pPr>
+            <a:endParaRPr lang="en-US" sz="2500" dirty="0"/>
+          </a:p>
+          <a:p>
+            <a:r>
+              <a:rPr lang="en-US" sz="2500" dirty="0"/>
+              <a:t>Syrian refugee migration peaks at around 2016 and has been slowly dropping</a:t>
+            </a:r>
+          </a:p>
+          <a:p>
+            <a:endParaRPr lang="en-US" sz="2500" dirty="0"/>
+          </a:p>
+          <a:p>
+            <a:r>
+              <a:rPr lang="en-US" sz="2500" dirty="0"/>
+              <a:t>Peaks in Syrian casualties can be linked to specific events</a:t>
+            </a:r>
           </a:p>
         </p:txBody>
       </p:sp>

</xml_diff>